<commit_message>
updated single slidewith all admin producer
</commit_message>
<xml_diff>
--- a/doc/SingleSlide/singleSlide.pptx
+++ b/doc/SingleSlide/singleSlide.pptx
@@ -192,7 +192,7 @@
           <a:p>
             <a:fld id="{F6EBCB7C-E5A9-4998-A589-EC95213B8355}" type="datetimeFigureOut">
               <a:rPr lang="it-IT" smtClean="0"/>
-              <a:t>09/04/2014</a:t>
+              <a:t>09/04/14</a:t>
             </a:fld>
             <a:endParaRPr lang="it-IT"/>
           </a:p>
@@ -351,7 +351,7 @@
           <a:p>
             <a:fld id="{4DC2E9EE-70EB-4125-97A0-04284EFEB55E}" type="slidenum">
               <a:rPr lang="it-IT" smtClean="0"/>
-              <a:t>‹N›</a:t>
+              <a:t>‹n.›</a:t>
             </a:fld>
             <a:endParaRPr lang="it-IT"/>
           </a:p>
@@ -725,7 +725,7 @@
           <a:p>
             <a:fld id="{F3BB6EA2-B085-5C44-98FF-4089F390D846}" type="datetimeFigureOut">
               <a:rPr lang="it-IT" smtClean="0"/>
-              <a:t>09/04/2014</a:t>
+              <a:t>09/04/14</a:t>
             </a:fld>
             <a:endParaRPr lang="it-IT"/>
           </a:p>
@@ -767,7 +767,7 @@
           <a:p>
             <a:fld id="{73EEE35A-8BBF-7E45-9B50-4A275ACC89A3}" type="slidenum">
               <a:rPr lang="it-IT" smtClean="0"/>
-              <a:t>‹N›</a:t>
+              <a:t>‹n.›</a:t>
             </a:fld>
             <a:endParaRPr lang="it-IT"/>
           </a:p>
@@ -895,7 +895,7 @@
           <a:p>
             <a:fld id="{F3BB6EA2-B085-5C44-98FF-4089F390D846}" type="datetimeFigureOut">
               <a:rPr lang="it-IT" smtClean="0"/>
-              <a:t>09/04/2014</a:t>
+              <a:t>09/04/14</a:t>
             </a:fld>
             <a:endParaRPr lang="it-IT"/>
           </a:p>
@@ -937,7 +937,7 @@
           <a:p>
             <a:fld id="{73EEE35A-8BBF-7E45-9B50-4A275ACC89A3}" type="slidenum">
               <a:rPr lang="it-IT" smtClean="0"/>
-              <a:t>‹N›</a:t>
+              <a:t>‹n.›</a:t>
             </a:fld>
             <a:endParaRPr lang="it-IT"/>
           </a:p>
@@ -1075,7 +1075,7 @@
           <a:p>
             <a:fld id="{F3BB6EA2-B085-5C44-98FF-4089F390D846}" type="datetimeFigureOut">
               <a:rPr lang="it-IT" smtClean="0"/>
-              <a:t>09/04/2014</a:t>
+              <a:t>09/04/14</a:t>
             </a:fld>
             <a:endParaRPr lang="it-IT"/>
           </a:p>
@@ -1117,7 +1117,7 @@
           <a:p>
             <a:fld id="{73EEE35A-8BBF-7E45-9B50-4A275ACC89A3}" type="slidenum">
               <a:rPr lang="it-IT" smtClean="0"/>
-              <a:t>‹N›</a:t>
+              <a:t>‹n.›</a:t>
             </a:fld>
             <a:endParaRPr lang="it-IT"/>
           </a:p>
@@ -1245,7 +1245,7 @@
           <a:p>
             <a:fld id="{F3BB6EA2-B085-5C44-98FF-4089F390D846}" type="datetimeFigureOut">
               <a:rPr lang="it-IT" smtClean="0"/>
-              <a:t>09/04/2014</a:t>
+              <a:t>09/04/14</a:t>
             </a:fld>
             <a:endParaRPr lang="it-IT"/>
           </a:p>
@@ -1287,7 +1287,7 @@
           <a:p>
             <a:fld id="{73EEE35A-8BBF-7E45-9B50-4A275ACC89A3}" type="slidenum">
               <a:rPr lang="it-IT" smtClean="0"/>
-              <a:t>‹N›</a:t>
+              <a:t>‹n.›</a:t>
             </a:fld>
             <a:endParaRPr lang="it-IT"/>
           </a:p>
@@ -1491,7 +1491,7 @@
           <a:p>
             <a:fld id="{F3BB6EA2-B085-5C44-98FF-4089F390D846}" type="datetimeFigureOut">
               <a:rPr lang="it-IT" smtClean="0"/>
-              <a:t>09/04/2014</a:t>
+              <a:t>09/04/14</a:t>
             </a:fld>
             <a:endParaRPr lang="it-IT"/>
           </a:p>
@@ -1533,7 +1533,7 @@
           <a:p>
             <a:fld id="{73EEE35A-8BBF-7E45-9B50-4A275ACC89A3}" type="slidenum">
               <a:rPr lang="it-IT" smtClean="0"/>
-              <a:t>‹N›</a:t>
+              <a:t>‹n.›</a:t>
             </a:fld>
             <a:endParaRPr lang="it-IT"/>
           </a:p>
@@ -1779,7 +1779,7 @@
           <a:p>
             <a:fld id="{F3BB6EA2-B085-5C44-98FF-4089F390D846}" type="datetimeFigureOut">
               <a:rPr lang="it-IT" smtClean="0"/>
-              <a:t>09/04/2014</a:t>
+              <a:t>09/04/14</a:t>
             </a:fld>
             <a:endParaRPr lang="it-IT"/>
           </a:p>
@@ -1821,7 +1821,7 @@
           <a:p>
             <a:fld id="{73EEE35A-8BBF-7E45-9B50-4A275ACC89A3}" type="slidenum">
               <a:rPr lang="it-IT" smtClean="0"/>
-              <a:t>‹N›</a:t>
+              <a:t>‹n.›</a:t>
             </a:fld>
             <a:endParaRPr lang="it-IT"/>
           </a:p>
@@ -2201,7 +2201,7 @@
           <a:p>
             <a:fld id="{F3BB6EA2-B085-5C44-98FF-4089F390D846}" type="datetimeFigureOut">
               <a:rPr lang="it-IT" smtClean="0"/>
-              <a:t>09/04/2014</a:t>
+              <a:t>09/04/14</a:t>
             </a:fld>
             <a:endParaRPr lang="it-IT"/>
           </a:p>
@@ -2243,7 +2243,7 @@
           <a:p>
             <a:fld id="{73EEE35A-8BBF-7E45-9B50-4A275ACC89A3}" type="slidenum">
               <a:rPr lang="it-IT" smtClean="0"/>
-              <a:t>‹N›</a:t>
+              <a:t>‹n.›</a:t>
             </a:fld>
             <a:endParaRPr lang="it-IT"/>
           </a:p>
@@ -2319,7 +2319,7 @@
           <a:p>
             <a:fld id="{F3BB6EA2-B085-5C44-98FF-4089F390D846}" type="datetimeFigureOut">
               <a:rPr lang="it-IT" smtClean="0"/>
-              <a:t>09/04/2014</a:t>
+              <a:t>09/04/14</a:t>
             </a:fld>
             <a:endParaRPr lang="it-IT"/>
           </a:p>
@@ -2361,7 +2361,7 @@
           <a:p>
             <a:fld id="{73EEE35A-8BBF-7E45-9B50-4A275ACC89A3}" type="slidenum">
               <a:rPr lang="it-IT" smtClean="0"/>
-              <a:t>‹N›</a:t>
+              <a:t>‹n.›</a:t>
             </a:fld>
             <a:endParaRPr lang="it-IT"/>
           </a:p>
@@ -2414,7 +2414,7 @@
           <a:p>
             <a:fld id="{F3BB6EA2-B085-5C44-98FF-4089F390D846}" type="datetimeFigureOut">
               <a:rPr lang="it-IT" smtClean="0"/>
-              <a:t>09/04/2014</a:t>
+              <a:t>09/04/14</a:t>
             </a:fld>
             <a:endParaRPr lang="it-IT"/>
           </a:p>
@@ -2456,7 +2456,7 @@
           <a:p>
             <a:fld id="{73EEE35A-8BBF-7E45-9B50-4A275ACC89A3}" type="slidenum">
               <a:rPr lang="it-IT" smtClean="0"/>
-              <a:t>‹N›</a:t>
+              <a:t>‹n.›</a:t>
             </a:fld>
             <a:endParaRPr lang="it-IT"/>
           </a:p>
@@ -2691,7 +2691,7 @@
           <a:p>
             <a:fld id="{F3BB6EA2-B085-5C44-98FF-4089F390D846}" type="datetimeFigureOut">
               <a:rPr lang="it-IT" smtClean="0"/>
-              <a:t>09/04/2014</a:t>
+              <a:t>09/04/14</a:t>
             </a:fld>
             <a:endParaRPr lang="it-IT"/>
           </a:p>
@@ -2733,7 +2733,7 @@
           <a:p>
             <a:fld id="{73EEE35A-8BBF-7E45-9B50-4A275ACC89A3}" type="slidenum">
               <a:rPr lang="it-IT" smtClean="0"/>
-              <a:t>‹N›</a:t>
+              <a:t>‹n.›</a:t>
             </a:fld>
             <a:endParaRPr lang="it-IT"/>
           </a:p>
@@ -2944,7 +2944,7 @@
           <a:p>
             <a:fld id="{F3BB6EA2-B085-5C44-98FF-4089F390D846}" type="datetimeFigureOut">
               <a:rPr lang="it-IT" smtClean="0"/>
-              <a:t>09/04/2014</a:t>
+              <a:t>09/04/14</a:t>
             </a:fld>
             <a:endParaRPr lang="it-IT"/>
           </a:p>
@@ -2986,7 +2986,7 @@
           <a:p>
             <a:fld id="{73EEE35A-8BBF-7E45-9B50-4A275ACC89A3}" type="slidenum">
               <a:rPr lang="it-IT" smtClean="0"/>
-              <a:t>‹N›</a:t>
+              <a:t>‹n.›</a:t>
             </a:fld>
             <a:endParaRPr lang="it-IT"/>
           </a:p>
@@ -3157,7 +3157,7 @@
           <a:p>
             <a:fld id="{F3BB6EA2-B085-5C44-98FF-4089F390D846}" type="datetimeFigureOut">
               <a:rPr lang="it-IT" smtClean="0"/>
-              <a:t>09/04/2014</a:t>
+              <a:t>09/04/14</a:t>
             </a:fld>
             <a:endParaRPr lang="it-IT"/>
           </a:p>
@@ -3235,7 +3235,7 @@
           <a:p>
             <a:fld id="{73EEE35A-8BBF-7E45-9B50-4A275ACC89A3}" type="slidenum">
               <a:rPr lang="it-IT" smtClean="0"/>
-              <a:t>‹N›</a:t>
+              <a:t>‹n.›</a:t>
             </a:fld>
             <a:endParaRPr lang="it-IT"/>
           </a:p>
@@ -3726,7 +3726,7 @@
             <a:tailEnd/>
           </a:ln>
           <a:extLst>
-            <a:ext uri="{909E8E84-426E-40DD-AFC4-6F175D3DCCD1}">
+            <a:ext uri="{909E8E84-426E-40dd-AFC4-6F175D3DCCD1}">
               <a14:hiddenFill xmlns:a14="http://schemas.microsoft.com/office/drawing/2010/main">
                 <a:solidFill>
                   <a:srgbClr val="FFFFFF"/>
@@ -3994,7 +3994,7 @@
               <a:tailEnd type="triangle" w="med" len="med"/>
             </a:ln>
             <a:extLst>
-              <a:ext uri="{909E8E84-426E-40DD-AFC4-6F175D3DCCD1}">
+              <a:ext uri="{909E8E84-426E-40dd-AFC4-6F175D3DCCD1}">
                 <a14:hiddenFill xmlns:a14="http://schemas.microsoft.com/office/drawing/2010/main">
                   <a:noFill/>
                 </a14:hiddenFill>
@@ -4030,7 +4030,7 @@
               <a:tailEnd type="triangle" w="med" len="med"/>
             </a:ln>
             <a:extLst>
-              <a:ext uri="{909E8E84-426E-40DD-AFC4-6F175D3DCCD1}">
+              <a:ext uri="{909E8E84-426E-40dd-AFC4-6F175D3DCCD1}">
                 <a14:hiddenFill xmlns:a14="http://schemas.microsoft.com/office/drawing/2010/main">
                   <a:noFill/>
                 </a14:hiddenFill>
@@ -4065,7 +4065,7 @@
               <a:tailEnd type="triangle" w="med" len="med"/>
             </a:ln>
             <a:extLst>
-              <a:ext uri="{909E8E84-426E-40DD-AFC4-6F175D3DCCD1}">
+              <a:ext uri="{909E8E84-426E-40dd-AFC4-6F175D3DCCD1}">
                 <a14:hiddenFill xmlns:a14="http://schemas.microsoft.com/office/drawing/2010/main">
                   <a:noFill/>
                 </a14:hiddenFill>
@@ -4186,31 +4186,17 @@
                 <a:latin typeface="Chalkboard"/>
                 <a:cs typeface="Chalkboard"/>
               </a:rPr>
-              <a:t> of </a:t>
-            </a:r>
+              <a:t> of Bologna</a:t>
+            </a:r>
+          </a:p>
+          <a:p>
+            <a:pPr lvl="0" algn="ctr"/>
             <a:r>
               <a:rPr lang="it-IT" sz="2000" u="none" dirty="0" smtClean="0">
                 <a:latin typeface="Chalkboard"/>
                 <a:cs typeface="Chalkboard"/>
               </a:rPr>
-              <a:t>Bologna</a:t>
-            </a:r>
-          </a:p>
-          <a:p>
-            <a:pPr lvl="0" algn="ctr"/>
-            <a:r>
-              <a:rPr lang="it-IT" sz="2000" u="none" dirty="0" smtClean="0">
-                <a:latin typeface="Chalkboard"/>
-                <a:cs typeface="Chalkboard"/>
-              </a:rPr>
-              <a:t>School </a:t>
-            </a:r>
-            <a:r>
-              <a:rPr lang="it-IT" sz="2000" u="none" dirty="0" smtClean="0">
-                <a:latin typeface="Chalkboard"/>
-                <a:cs typeface="Chalkboard"/>
-              </a:rPr>
-              <a:t>of </a:t>
+              <a:t>School of </a:t>
             </a:r>
             <a:r>
               <a:rPr lang="it-IT" sz="2000" u="none" dirty="0" err="1" smtClean="0">
@@ -5113,11 +5099,7 @@
             </a:r>
             <a:r>
               <a:rPr lang="it-IT" sz="1050" u="none" dirty="0" smtClean="0"/>
-              <a:t> </a:t>
-            </a:r>
-            <a:r>
-              <a:rPr lang="it-IT" sz="1050" u="none" dirty="0" smtClean="0"/>
-              <a:t>games</a:t>
+              <a:t> games</a:t>
             </a:r>
             <a:endParaRPr lang="it-IT" sz="1050" u="none" dirty="0"/>
           </a:p>
@@ -5151,11 +5133,7 @@
             </a:r>
             <a:r>
               <a:rPr lang="it-IT" sz="1050" u="none" dirty="0" smtClean="0"/>
-              <a:t> </a:t>
-            </a:r>
-            <a:r>
-              <a:rPr lang="it-IT" sz="1050" u="none" dirty="0" smtClean="0"/>
-              <a:t>game</a:t>
+              <a:t> game</a:t>
             </a:r>
             <a:endParaRPr lang="it-IT" sz="1050" u="none" dirty="0"/>
           </a:p>
@@ -5351,7 +5329,7 @@
         </p:nvSpPr>
         <p:spPr bwMode="auto">
           <a:xfrm>
-            <a:off x="7607419" y="5612328"/>
+            <a:off x="7607419" y="6035608"/>
             <a:ext cx="254555" cy="205430"/>
           </a:xfrm>
           <a:prstGeom prst="roundRect">
@@ -5402,7 +5380,7 @@
         </p:nvSpPr>
         <p:spPr bwMode="auto">
           <a:xfrm>
-            <a:off x="7606293" y="5357472"/>
+            <a:off x="7606293" y="5780752"/>
             <a:ext cx="255681" cy="205430"/>
           </a:xfrm>
           <a:prstGeom prst="roundRect">
@@ -5457,7 +5435,7 @@
         </p:nvSpPr>
         <p:spPr>
           <a:xfrm>
-            <a:off x="7861972" y="5588085"/>
+            <a:off x="7861972" y="6011365"/>
             <a:ext cx="1246399" cy="253916"/>
           </a:xfrm>
           <a:prstGeom prst="rect">
@@ -5491,8 +5469,8 @@
         </p:nvSpPr>
         <p:spPr>
           <a:xfrm>
-            <a:off x="7861974" y="5346972"/>
-            <a:ext cx="878767" cy="253916"/>
+            <a:off x="7861974" y="5770252"/>
+            <a:ext cx="697627" cy="253916"/>
           </a:xfrm>
           <a:prstGeom prst="rect">
             <a:avLst/>
@@ -5507,7 +5485,7 @@
           <a:p>
             <a:r>
               <a:rPr lang="it-IT" sz="1050" u="none" dirty="0" smtClean="0"/>
-              <a:t>Delete game</a:t>
+              <a:t>Reset SIB</a:t>
             </a:r>
             <a:endParaRPr lang="it-IT" sz="1050" u="none" dirty="0"/>
           </a:p>
@@ -5912,6 +5890,275 @@
           </a:prstGeom>
         </p:spPr>
       </p:pic>
+      <p:sp>
+        <p:nvSpPr>
+          <p:cNvPr id="56" name="Rettangolo arrotondato 13"/>
+          <p:cNvSpPr>
+            <a:spLocks noChangeArrowheads="1"/>
+          </p:cNvSpPr>
+          <p:nvPr/>
+        </p:nvSpPr>
+        <p:spPr bwMode="auto">
+          <a:xfrm>
+            <a:off x="7594443" y="5523528"/>
+            <a:ext cx="255681" cy="205430"/>
+          </a:xfrm>
+          <a:prstGeom prst="roundRect">
+            <a:avLst>
+              <a:gd name="adj" fmla="val 16667"/>
+            </a:avLst>
+          </a:prstGeom>
+          <a:solidFill>
+            <a:srgbClr val="DBEEF4"/>
+          </a:solidFill>
+          <a:ln w="25400">
+            <a:solidFill>
+              <a:srgbClr val="215968"/>
+            </a:solidFill>
+            <a:round/>
+            <a:headEnd/>
+            <a:tailEnd/>
+          </a:ln>
+        </p:spPr>
+        <p:txBody>
+          <a:bodyPr wrap="none" lIns="17998" tIns="45715" rIns="17998" bIns="45715" anchor="ctr"/>
+          <a:lstStyle/>
+          <a:p>
+            <a:pPr algn="ctr"/>
+            <a:r>
+              <a:rPr lang="it-IT" sz="1200" u="none" dirty="0">
+                <a:solidFill>
+                  <a:srgbClr val="215968"/>
+                </a:solidFill>
+                <a:latin typeface="Calibri" charset="0"/>
+                <a:ea typeface="MS PGothic" charset="0"/>
+                <a:cs typeface="MS PGothic" charset="0"/>
+              </a:rPr>
+              <a:t>KP</a:t>
+            </a:r>
+            <a:endParaRPr lang="it-IT" sz="1200" u="none" dirty="0">
+              <a:solidFill>
+                <a:srgbClr val="4F6228"/>
+              </a:solidFill>
+              <a:latin typeface="Calibri" charset="0"/>
+              <a:ea typeface="MS PGothic" charset="0"/>
+              <a:cs typeface="MS PGothic" charset="0"/>
+            </a:endParaRPr>
+          </a:p>
+        </p:txBody>
+      </p:sp>
+      <p:sp>
+        <p:nvSpPr>
+          <p:cNvPr id="57" name="CasellaDiTesto 56"/>
+          <p:cNvSpPr txBox="1"/>
+          <p:nvPr/>
+        </p:nvSpPr>
+        <p:spPr>
+          <a:xfrm>
+            <a:off x="7850124" y="5513028"/>
+            <a:ext cx="697627" cy="253916"/>
+          </a:xfrm>
+          <a:prstGeom prst="rect">
+            <a:avLst/>
+          </a:prstGeom>
+          <a:noFill/>
+        </p:spPr>
+        <p:txBody>
+          <a:bodyPr wrap="none" rtlCol="0">
+            <a:spAutoFit/>
+          </a:bodyPr>
+          <a:lstStyle/>
+          <a:p>
+            <a:r>
+              <a:rPr lang="it-IT" sz="1050" dirty="0" err="1" smtClean="0"/>
+              <a:t>Clean</a:t>
+            </a:r>
+            <a:r>
+              <a:rPr lang="it-IT" sz="1050" dirty="0" smtClean="0"/>
+              <a:t> SIB</a:t>
+            </a:r>
+            <a:endParaRPr lang="it-IT" sz="1050" u="none" dirty="0"/>
+          </a:p>
+        </p:txBody>
+      </p:sp>
+      <p:sp>
+        <p:nvSpPr>
+          <p:cNvPr id="59" name="Rettangolo arrotondato 13"/>
+          <p:cNvSpPr>
+            <a:spLocks noChangeArrowheads="1"/>
+          </p:cNvSpPr>
+          <p:nvPr/>
+        </p:nvSpPr>
+        <p:spPr bwMode="auto">
+          <a:xfrm>
+            <a:off x="7594443" y="5007071"/>
+            <a:ext cx="255681" cy="205430"/>
+          </a:xfrm>
+          <a:prstGeom prst="roundRect">
+            <a:avLst>
+              <a:gd name="adj" fmla="val 16667"/>
+            </a:avLst>
+          </a:prstGeom>
+          <a:solidFill>
+            <a:srgbClr val="DBEEF4"/>
+          </a:solidFill>
+          <a:ln w="25400">
+            <a:solidFill>
+              <a:srgbClr val="215968"/>
+            </a:solidFill>
+            <a:round/>
+            <a:headEnd/>
+            <a:tailEnd/>
+          </a:ln>
+        </p:spPr>
+        <p:txBody>
+          <a:bodyPr wrap="none" lIns="17998" tIns="45715" rIns="17998" bIns="45715" anchor="ctr"/>
+          <a:lstStyle/>
+          <a:p>
+            <a:pPr algn="ctr"/>
+            <a:r>
+              <a:rPr lang="it-IT" sz="1200" u="none" dirty="0">
+                <a:solidFill>
+                  <a:srgbClr val="215968"/>
+                </a:solidFill>
+                <a:latin typeface="Calibri" charset="0"/>
+                <a:ea typeface="MS PGothic" charset="0"/>
+                <a:cs typeface="MS PGothic" charset="0"/>
+              </a:rPr>
+              <a:t>KP</a:t>
+            </a:r>
+            <a:endParaRPr lang="it-IT" sz="1200" u="none" dirty="0">
+              <a:solidFill>
+                <a:srgbClr val="4F6228"/>
+              </a:solidFill>
+              <a:latin typeface="Calibri" charset="0"/>
+              <a:ea typeface="MS PGothic" charset="0"/>
+              <a:cs typeface="MS PGothic" charset="0"/>
+            </a:endParaRPr>
+          </a:p>
+        </p:txBody>
+      </p:sp>
+      <p:sp>
+        <p:nvSpPr>
+          <p:cNvPr id="60" name="CasellaDiTesto 59"/>
+          <p:cNvSpPr txBox="1"/>
+          <p:nvPr/>
+        </p:nvSpPr>
+        <p:spPr>
+          <a:xfrm>
+            <a:off x="7850124" y="4996571"/>
+            <a:ext cx="878767" cy="253916"/>
+          </a:xfrm>
+          <a:prstGeom prst="rect">
+            <a:avLst/>
+          </a:prstGeom>
+          <a:noFill/>
+        </p:spPr>
+        <p:txBody>
+          <a:bodyPr wrap="none" rtlCol="0">
+            <a:spAutoFit/>
+          </a:bodyPr>
+          <a:lstStyle/>
+          <a:p>
+            <a:r>
+              <a:rPr lang="it-IT" sz="1050" u="none" dirty="0" smtClean="0"/>
+              <a:t>Delete game</a:t>
+            </a:r>
+            <a:endParaRPr lang="it-IT" sz="1050" u="none" dirty="0"/>
+          </a:p>
+        </p:txBody>
+      </p:sp>
+      <p:sp>
+        <p:nvSpPr>
+          <p:cNvPr id="61" name="Rettangolo arrotondato 13"/>
+          <p:cNvSpPr>
+            <a:spLocks noChangeArrowheads="1"/>
+          </p:cNvSpPr>
+          <p:nvPr/>
+        </p:nvSpPr>
+        <p:spPr bwMode="auto">
+          <a:xfrm>
+            <a:off x="7594443" y="5265617"/>
+            <a:ext cx="255681" cy="205430"/>
+          </a:xfrm>
+          <a:prstGeom prst="roundRect">
+            <a:avLst>
+              <a:gd name="adj" fmla="val 16667"/>
+            </a:avLst>
+          </a:prstGeom>
+          <a:solidFill>
+            <a:srgbClr val="DBEEF4"/>
+          </a:solidFill>
+          <a:ln w="25400">
+            <a:solidFill>
+              <a:srgbClr val="215968"/>
+            </a:solidFill>
+            <a:round/>
+            <a:headEnd/>
+            <a:tailEnd/>
+          </a:ln>
+        </p:spPr>
+        <p:txBody>
+          <a:bodyPr wrap="none" lIns="17998" tIns="45715" rIns="17998" bIns="45715" anchor="ctr"/>
+          <a:lstStyle/>
+          <a:p>
+            <a:pPr algn="ctr"/>
+            <a:r>
+              <a:rPr lang="it-IT" sz="1200" u="none" dirty="0">
+                <a:solidFill>
+                  <a:srgbClr val="215968"/>
+                </a:solidFill>
+                <a:latin typeface="Calibri" charset="0"/>
+                <a:ea typeface="MS PGothic" charset="0"/>
+                <a:cs typeface="MS PGothic" charset="0"/>
+              </a:rPr>
+              <a:t>KP</a:t>
+            </a:r>
+            <a:endParaRPr lang="it-IT" sz="1200" u="none" dirty="0">
+              <a:solidFill>
+                <a:srgbClr val="4F6228"/>
+              </a:solidFill>
+              <a:latin typeface="Calibri" charset="0"/>
+              <a:ea typeface="MS PGothic" charset="0"/>
+              <a:cs typeface="MS PGothic" charset="0"/>
+            </a:endParaRPr>
+          </a:p>
+        </p:txBody>
+      </p:sp>
+      <p:sp>
+        <p:nvSpPr>
+          <p:cNvPr id="62" name="CasellaDiTesto 61"/>
+          <p:cNvSpPr txBox="1"/>
+          <p:nvPr/>
+        </p:nvSpPr>
+        <p:spPr>
+          <a:xfrm>
+            <a:off x="7850124" y="5255117"/>
+            <a:ext cx="569387" cy="253916"/>
+          </a:xfrm>
+          <a:prstGeom prst="rect">
+            <a:avLst/>
+          </a:prstGeom>
+          <a:noFill/>
+        </p:spPr>
+        <p:txBody>
+          <a:bodyPr wrap="none" rtlCol="0">
+            <a:spAutoFit/>
+          </a:bodyPr>
+          <a:lstStyle/>
+          <a:p>
+            <a:r>
+              <a:rPr lang="it-IT" sz="1050" u="none" dirty="0" err="1" smtClean="0"/>
+              <a:t>Init</a:t>
+            </a:r>
+            <a:r>
+              <a:rPr lang="it-IT" sz="1050" u="none" dirty="0" smtClean="0"/>
+              <a:t> SIB</a:t>
+            </a:r>
+            <a:endParaRPr lang="it-IT" sz="1050" u="none" dirty="0"/>
+          </a:p>
+        </p:txBody>
+      </p:sp>
     </p:spTree>
     <p:extLst>
       <p:ext uri="{BB962C8B-B14F-4D97-AF65-F5344CB8AC3E}">
@@ -5925,7 +6172,7 @@
   <p:timing>
     <p:tnLst>
       <p:par>
-        <p:cTn id="1" dur="indefinite" restart="never" nodeType="tmRoot"/>
+        <p:cTn xmlns:p14="http://schemas.microsoft.com/office/powerpoint/2010/main" id="1" dur="indefinite" restart="never" nodeType="tmRoot"/>
       </p:par>
     </p:tnLst>
   </p:timing>

</xml_diff>